<commit_message>
Moved notes to OCP and added animations
</commit_message>
<xml_diff>
--- a/Presentations/OCP.pptx
+++ b/Presentations/OCP.pptx
@@ -562,6 +562,202 @@
 </p:notes>
 </file>
 
+<file path=ppt/notesSlides/notesSlide10.xml><?xml version="1.0" encoding="utf-8"?>
+<p:notes xmlns:a="http://schemas.openxmlformats.org/drawingml/2006/main" xmlns:r="http://schemas.openxmlformats.org/officeDocument/2006/relationships" xmlns:p="http://schemas.openxmlformats.org/presentationml/2006/main">
+  <p:cSld>
+    <p:spTree>
+      <p:nvGrpSpPr>
+        <p:cNvPr id="1" name=""/>
+        <p:cNvGrpSpPr/>
+        <p:nvPr/>
+      </p:nvGrpSpPr>
+      <p:grpSpPr>
+        <a:xfrm>
+          <a:off x="0" y="0"/>
+          <a:ext cx="0" cy="0"/>
+          <a:chOff x="0" y="0"/>
+          <a:chExt cx="0" cy="0"/>
+        </a:xfrm>
+      </p:grpSpPr>
+      <p:sp>
+        <p:nvSpPr>
+          <p:cNvPr id="2" name="Slide Image Placeholder 1"/>
+          <p:cNvSpPr>
+            <a:spLocks noGrp="1" noRot="1" noChangeAspect="1"/>
+          </p:cNvSpPr>
+          <p:nvPr>
+            <p:ph type="sldImg"/>
+          </p:nvPr>
+        </p:nvSpPr>
+        <p:spPr/>
+      </p:sp>
+      <p:sp>
+        <p:nvSpPr>
+          <p:cNvPr id="3" name="Notes Placeholder 2"/>
+          <p:cNvSpPr>
+            <a:spLocks noGrp="1"/>
+          </p:cNvSpPr>
+          <p:nvPr>
+            <p:ph type="body" idx="1"/>
+          </p:nvPr>
+        </p:nvSpPr>
+        <p:spPr/>
+        <p:txBody>
+          <a:bodyPr/>
+          <a:lstStyle/>
+          <a:p>
+            <a:pPr marL="0" marR="0" indent="0" algn="l" defTabSz="914400" rtl="0" eaLnBrk="1" fontAlgn="auto" latinLnBrk="0" hangingPunct="1">
+              <a:lnSpc>
+                <a:spcPct val="100000"/>
+              </a:lnSpc>
+              <a:spcBef>
+                <a:spcPts val="0"/>
+              </a:spcBef>
+              <a:spcAft>
+                <a:spcPts val="0"/>
+              </a:spcAft>
+              <a:buClrTx/>
+              <a:buSzTx/>
+              <a:buFontTx/>
+              <a:buNone/>
+              <a:tabLst/>
+              <a:defRPr/>
+            </a:pPr>
+            <a:r>
+              <a:rPr lang="en-US" dirty="0" smtClean="0"/>
+              <a:t>Again call out that everything should build and all tests should be</a:t>
+            </a:r>
+            <a:r>
+              <a:rPr lang="en-US" baseline="0" dirty="0" smtClean="0"/>
+              <a:t> green.</a:t>
+            </a:r>
+            <a:endParaRPr lang="en-US" dirty="0" smtClean="0"/>
+          </a:p>
+          <a:p>
+            <a:endParaRPr lang="en-US" dirty="0"/>
+          </a:p>
+        </p:txBody>
+      </p:sp>
+      <p:sp>
+        <p:nvSpPr>
+          <p:cNvPr id="4" name="Slide Number Placeholder 3"/>
+          <p:cNvSpPr>
+            <a:spLocks noGrp="1"/>
+          </p:cNvSpPr>
+          <p:nvPr>
+            <p:ph type="sldNum" sz="quarter" idx="10"/>
+          </p:nvPr>
+        </p:nvSpPr>
+        <p:spPr/>
+        <p:txBody>
+          <a:bodyPr/>
+          <a:lstStyle/>
+          <a:p>
+            <a:fld id="{5E646BB7-50E9-43CE-B8D8-A01580F287EB}" type="slidenum">
+              <a:rPr lang="en-US" smtClean="0"/>
+              <a:t>13</a:t>
+            </a:fld>
+            <a:endParaRPr lang="en-US"/>
+          </a:p>
+        </p:txBody>
+      </p:sp>
+    </p:spTree>
+    <p:extLst>
+      <p:ext uri="{BB962C8B-B14F-4D97-AF65-F5344CB8AC3E}">
+        <p14:creationId xmlns:p14="http://schemas.microsoft.com/office/powerpoint/2010/main" val="2446042656"/>
+      </p:ext>
+    </p:extLst>
+  </p:cSld>
+  <p:clrMapOvr>
+    <a:masterClrMapping/>
+  </p:clrMapOvr>
+</p:notes>
+</file>
+
+<file path=ppt/notesSlides/notesSlide11.xml><?xml version="1.0" encoding="utf-8"?>
+<p:notes xmlns:a="http://schemas.openxmlformats.org/drawingml/2006/main" xmlns:r="http://schemas.openxmlformats.org/officeDocument/2006/relationships" xmlns:p="http://schemas.openxmlformats.org/presentationml/2006/main">
+  <p:cSld>
+    <p:spTree>
+      <p:nvGrpSpPr>
+        <p:cNvPr id="1" name=""/>
+        <p:cNvGrpSpPr/>
+        <p:nvPr/>
+      </p:nvGrpSpPr>
+      <p:grpSpPr>
+        <a:xfrm>
+          <a:off x="0" y="0"/>
+          <a:ext cx="0" cy="0"/>
+          <a:chOff x="0" y="0"/>
+          <a:chExt cx="0" cy="0"/>
+        </a:xfrm>
+      </p:grpSpPr>
+      <p:sp>
+        <p:nvSpPr>
+          <p:cNvPr id="2" name="Slide Image Placeholder 1"/>
+          <p:cNvSpPr>
+            <a:spLocks noGrp="1" noRot="1" noChangeAspect="1"/>
+          </p:cNvSpPr>
+          <p:nvPr>
+            <p:ph type="sldImg"/>
+          </p:nvPr>
+        </p:nvSpPr>
+        <p:spPr/>
+      </p:sp>
+      <p:sp>
+        <p:nvSpPr>
+          <p:cNvPr id="3" name="Notes Placeholder 2"/>
+          <p:cNvSpPr>
+            <a:spLocks noGrp="1"/>
+          </p:cNvSpPr>
+          <p:nvPr>
+            <p:ph type="body" idx="1"/>
+          </p:nvPr>
+        </p:nvSpPr>
+        <p:spPr/>
+        <p:txBody>
+          <a:bodyPr/>
+          <a:lstStyle/>
+          <a:p>
+            <a:endParaRPr lang="en-US" dirty="0"/>
+          </a:p>
+        </p:txBody>
+      </p:sp>
+      <p:sp>
+        <p:nvSpPr>
+          <p:cNvPr id="4" name="Slide Number Placeholder 3"/>
+          <p:cNvSpPr>
+            <a:spLocks noGrp="1"/>
+          </p:cNvSpPr>
+          <p:nvPr>
+            <p:ph type="sldNum" sz="quarter" idx="10"/>
+          </p:nvPr>
+        </p:nvSpPr>
+        <p:spPr/>
+        <p:txBody>
+          <a:bodyPr/>
+          <a:lstStyle/>
+          <a:p>
+            <a:fld id="{5E646BB7-50E9-43CE-B8D8-A01580F287EB}" type="slidenum">
+              <a:rPr lang="en-US" smtClean="0"/>
+              <a:t>14</a:t>
+            </a:fld>
+            <a:endParaRPr lang="en-US"/>
+          </a:p>
+        </p:txBody>
+      </p:sp>
+    </p:spTree>
+    <p:extLst>
+      <p:ext uri="{BB962C8B-B14F-4D97-AF65-F5344CB8AC3E}">
+        <p14:creationId xmlns:p14="http://schemas.microsoft.com/office/powerpoint/2010/main" val="1253779816"/>
+      </p:ext>
+    </p:extLst>
+  </p:cSld>
+  <p:clrMapOvr>
+    <a:masterClrMapping/>
+  </p:clrMapOvr>
+</p:notes>
+</file>
+
 <file path=ppt/notesSlides/notesSlide2.xml><?xml version="1.0" encoding="utf-8"?>
 <p:notes xmlns:a="http://schemas.openxmlformats.org/drawingml/2006/main" xmlns:r="http://schemas.openxmlformats.org/officeDocument/2006/relationships" xmlns:p="http://schemas.openxmlformats.org/presentationml/2006/main">
   <p:cSld>
@@ -606,7 +802,7 @@
           <a:bodyPr/>
           <a:lstStyle/>
           <a:p>
-            <a:endParaRPr lang="en-US" dirty="0"/>
+            <a:endParaRPr lang="en-US"/>
           </a:p>
         </p:txBody>
       </p:sp>
@@ -627,7 +823,7 @@
           <a:p>
             <a:fld id="{5E646BB7-50E9-43CE-B8D8-A01580F287EB}" type="slidenum">
               <a:rPr lang="en-US" smtClean="0"/>
-              <a:t>5</a:t>
+              <a:t>2</a:t>
             </a:fld>
             <a:endParaRPr lang="en-US"/>
           </a:p>
@@ -636,7 +832,7 @@
     </p:spTree>
     <p:extLst>
       <p:ext uri="{BB962C8B-B14F-4D97-AF65-F5344CB8AC3E}">
-        <p14:creationId xmlns:p14="http://schemas.microsoft.com/office/powerpoint/2010/main" val="381610740"/>
+        <p14:creationId xmlns:p14="http://schemas.microsoft.com/office/powerpoint/2010/main" val="3391248921"/>
       </p:ext>
     </p:extLst>
   </p:cSld>
@@ -692,23 +888,37 @@
           <a:p>
             <a:r>
               <a:rPr lang="en-US" dirty="0" smtClean="0"/>
-              <a:t>Old design</a:t>
+              <a:t>Open</a:t>
             </a:r>
             <a:r>
               <a:rPr lang="en-US" baseline="0" dirty="0" smtClean="0"/>
-              <a:t> required constant change to </a:t>
-            </a:r>
-            <a:r>
-              <a:rPr lang="en-US" baseline="0" dirty="0" err="1" smtClean="0"/>
-              <a:t>ReportEngine</a:t>
-            </a:r>
-            <a:endParaRPr lang="en-US" baseline="0" dirty="0" smtClean="0"/>
-          </a:p>
-          <a:p>
+              <a:t> means it’s an extension point. Need to strategically pick them.</a:t>
+            </a:r>
+            <a:endParaRPr lang="en-US" dirty="0" smtClean="0"/>
+          </a:p>
+          <a:p>
+            <a:r>
+              <a:rPr lang="en-US" dirty="0" smtClean="0"/>
+              <a:t>Open for</a:t>
+            </a:r>
             <a:r>
               <a:rPr lang="en-US" baseline="0" dirty="0" smtClean="0"/>
-              <a:t>New design only requires creation of new classes for new behavior</a:t>
-            </a:r>
+              <a:t> most probable changes refers to game-planning your classes for where you think changes will happen.</a:t>
+            </a:r>
+          </a:p>
+          <a:p>
+            <a:r>
+              <a:rPr lang="en-US" baseline="0" dirty="0" smtClean="0"/>
+              <a:t>Talk about how you want to minimize code changes in the future.</a:t>
+            </a:r>
+          </a:p>
+          <a:p>
+            <a:r>
+              <a:rPr lang="en-US" baseline="0" dirty="0" smtClean="0"/>
+              <a:t>Refer to a credit card example and how the swipe method would be something you’d want to change.</a:t>
+            </a:r>
+          </a:p>
+          <a:p>
             <a:endParaRPr lang="en-US" dirty="0"/>
           </a:p>
         </p:txBody>
@@ -730,7 +940,7 @@
           <a:p>
             <a:fld id="{5E646BB7-50E9-43CE-B8D8-A01580F287EB}" type="slidenum">
               <a:rPr lang="en-US" smtClean="0"/>
-              <a:t>8</a:t>
+              <a:t>3</a:t>
             </a:fld>
             <a:endParaRPr lang="en-US"/>
           </a:p>
@@ -739,7 +949,7 @@
     </p:spTree>
     <p:extLst>
       <p:ext uri="{BB962C8B-B14F-4D97-AF65-F5344CB8AC3E}">
-        <p14:creationId xmlns:p14="http://schemas.microsoft.com/office/powerpoint/2010/main" val="89259284"/>
+        <p14:creationId xmlns:p14="http://schemas.microsoft.com/office/powerpoint/2010/main" val="2834003571"/>
       </p:ext>
     </p:extLst>
   </p:cSld>
@@ -793,19 +1003,34 @@
           <a:bodyPr/>
           <a:lstStyle/>
           <a:p>
-            <a:r>
-              <a:rPr lang="en-US" dirty="0" smtClean="0"/>
-              <a:t>SHOW THE APPLICATION!</a:t>
-            </a:r>
-          </a:p>
-          <a:p>
-            <a:r>
-              <a:rPr lang="en-US" dirty="0" smtClean="0"/>
-              <a:t>Call</a:t>
-            </a:r>
-            <a:r>
-              <a:rPr lang="en-US" baseline="0" dirty="0" smtClean="0"/>
-              <a:t> out that they should be able to build and run</a:t>
+            <a:pPr marL="0" marR="0" lvl="0" indent="0" algn="l" defTabSz="914400" rtl="0" eaLnBrk="1" fontAlgn="auto" latinLnBrk="0" hangingPunct="1">
+              <a:lnSpc>
+                <a:spcPct val="100000"/>
+              </a:lnSpc>
+              <a:spcBef>
+                <a:spcPts val="0"/>
+              </a:spcBef>
+              <a:spcAft>
+                <a:spcPts val="0"/>
+              </a:spcAft>
+              <a:buClrTx/>
+              <a:buSzTx/>
+              <a:buFontTx/>
+              <a:buNone/>
+              <a:tabLst/>
+              <a:defRPr/>
+            </a:pPr>
+            <a:r>
+              <a:rPr lang="en-US" sz="1200" kern="1200" dirty="0" smtClean="0">
+                <a:solidFill>
+                  <a:schemeClr val="tx1"/>
+                </a:solidFill>
+                <a:effectLst/>
+                <a:latin typeface="+mn-lt"/>
+                <a:ea typeface="+mn-ea"/>
+                <a:cs typeface="+mn-cs"/>
+              </a:rPr>
+              <a:t>In a perfect world, Tests and hopefully applying these principles on new code (not existing) but we are working on a clock here </a:t>
             </a:r>
           </a:p>
         </p:txBody>
@@ -827,7 +1052,7 @@
           <a:p>
             <a:fld id="{5E646BB7-50E9-43CE-B8D8-A01580F287EB}" type="slidenum">
               <a:rPr lang="en-US" smtClean="0"/>
-              <a:t>10</a:t>
+              <a:t>4</a:t>
             </a:fld>
             <a:endParaRPr lang="en-US"/>
           </a:p>
@@ -836,7 +1061,7 @@
     </p:spTree>
     <p:extLst>
       <p:ext uri="{BB962C8B-B14F-4D97-AF65-F5344CB8AC3E}">
-        <p14:creationId xmlns:p14="http://schemas.microsoft.com/office/powerpoint/2010/main" val="2420853714"/>
+        <p14:creationId xmlns:p14="http://schemas.microsoft.com/office/powerpoint/2010/main" val="2023424501"/>
       </p:ext>
     </p:extLst>
   </p:cSld>
@@ -911,7 +1136,7 @@
           <a:p>
             <a:fld id="{5E646BB7-50E9-43CE-B8D8-A01580F287EB}" type="slidenum">
               <a:rPr lang="en-US" smtClean="0"/>
-              <a:t>12</a:t>
+              <a:t>5</a:t>
             </a:fld>
             <a:endParaRPr lang="en-US"/>
           </a:p>
@@ -920,7 +1145,7 @@
     </p:spTree>
     <p:extLst>
       <p:ext uri="{BB962C8B-B14F-4D97-AF65-F5344CB8AC3E}">
-        <p14:creationId xmlns:p14="http://schemas.microsoft.com/office/powerpoint/2010/main" val="574377017"/>
+        <p14:creationId xmlns:p14="http://schemas.microsoft.com/office/powerpoint/2010/main" val="381610740"/>
       </p:ext>
     </p:extLst>
   </p:cSld>
@@ -974,6 +1199,25 @@
           <a:bodyPr/>
           <a:lstStyle/>
           <a:p>
+            <a:r>
+              <a:rPr lang="en-US" dirty="0" smtClean="0"/>
+              <a:t>Old design</a:t>
+            </a:r>
+            <a:r>
+              <a:rPr lang="en-US" baseline="0" dirty="0" smtClean="0"/>
+              <a:t> required constant change to </a:t>
+            </a:r>
+            <a:r>
+              <a:rPr lang="en-US" baseline="0" dirty="0" err="1" smtClean="0"/>
+              <a:t>ReportEngine</a:t>
+            </a:r>
+            <a:endParaRPr lang="en-US" baseline="0" dirty="0" smtClean="0"/>
+          </a:p>
+          <a:p>
+            <a:r>
+              <a:rPr lang="en-US" baseline="0" dirty="0" smtClean="0"/>
+              <a:t>New design only requires creation of new classes for new behavior</a:t>
+            </a:r>
             <a:endParaRPr lang="en-US" dirty="0"/>
           </a:p>
         </p:txBody>
@@ -995,7 +1239,7 @@
           <a:p>
             <a:fld id="{5E646BB7-50E9-43CE-B8D8-A01580F287EB}" type="slidenum">
               <a:rPr lang="en-US" smtClean="0"/>
-              <a:t>14</a:t>
+              <a:t>8</a:t>
             </a:fld>
             <a:endParaRPr lang="en-US"/>
           </a:p>
@@ -1004,7 +1248,293 @@
     </p:spTree>
     <p:extLst>
       <p:ext uri="{BB962C8B-B14F-4D97-AF65-F5344CB8AC3E}">
-        <p14:creationId xmlns:p14="http://schemas.microsoft.com/office/powerpoint/2010/main" val="1253779816"/>
+        <p14:creationId xmlns:p14="http://schemas.microsoft.com/office/powerpoint/2010/main" val="89259284"/>
+      </p:ext>
+    </p:extLst>
+  </p:cSld>
+  <p:clrMapOvr>
+    <a:masterClrMapping/>
+  </p:clrMapOvr>
+</p:notes>
+</file>
+
+<file path=ppt/notesSlides/notesSlide7.xml><?xml version="1.0" encoding="utf-8"?>
+<p:notes xmlns:a="http://schemas.openxmlformats.org/drawingml/2006/main" xmlns:r="http://schemas.openxmlformats.org/officeDocument/2006/relationships" xmlns:p="http://schemas.openxmlformats.org/presentationml/2006/main">
+  <p:cSld>
+    <p:spTree>
+      <p:nvGrpSpPr>
+        <p:cNvPr id="1" name=""/>
+        <p:cNvGrpSpPr/>
+        <p:nvPr/>
+      </p:nvGrpSpPr>
+      <p:grpSpPr>
+        <a:xfrm>
+          <a:off x="0" y="0"/>
+          <a:ext cx="0" cy="0"/>
+          <a:chOff x="0" y="0"/>
+          <a:chExt cx="0" cy="0"/>
+        </a:xfrm>
+      </p:grpSpPr>
+      <p:sp>
+        <p:nvSpPr>
+          <p:cNvPr id="2" name="Slide Image Placeholder 1"/>
+          <p:cNvSpPr>
+            <a:spLocks noGrp="1" noRot="1" noChangeAspect="1"/>
+          </p:cNvSpPr>
+          <p:nvPr>
+            <p:ph type="sldImg"/>
+          </p:nvPr>
+        </p:nvSpPr>
+        <p:spPr/>
+      </p:sp>
+      <p:sp>
+        <p:nvSpPr>
+          <p:cNvPr id="3" name="Notes Placeholder 2"/>
+          <p:cNvSpPr>
+            <a:spLocks noGrp="1"/>
+          </p:cNvSpPr>
+          <p:nvPr>
+            <p:ph type="body" idx="1"/>
+          </p:nvPr>
+        </p:nvSpPr>
+        <p:spPr/>
+        <p:txBody>
+          <a:bodyPr/>
+          <a:lstStyle/>
+          <a:p>
+            <a:endParaRPr lang="en-US" dirty="0"/>
+          </a:p>
+        </p:txBody>
+      </p:sp>
+      <p:sp>
+        <p:nvSpPr>
+          <p:cNvPr id="4" name="Slide Number Placeholder 3"/>
+          <p:cNvSpPr>
+            <a:spLocks noGrp="1"/>
+          </p:cNvSpPr>
+          <p:nvPr>
+            <p:ph type="sldNum" sz="quarter" idx="10"/>
+          </p:nvPr>
+        </p:nvSpPr>
+        <p:spPr/>
+        <p:txBody>
+          <a:bodyPr/>
+          <a:lstStyle/>
+          <a:p>
+            <a:fld id="{5E646BB7-50E9-43CE-B8D8-A01580F287EB}" type="slidenum">
+              <a:rPr lang="en-US" smtClean="0"/>
+              <a:t>9</a:t>
+            </a:fld>
+            <a:endParaRPr lang="en-US"/>
+          </a:p>
+        </p:txBody>
+      </p:sp>
+    </p:spTree>
+    <p:extLst>
+      <p:ext uri="{BB962C8B-B14F-4D97-AF65-F5344CB8AC3E}">
+        <p14:creationId xmlns:p14="http://schemas.microsoft.com/office/powerpoint/2010/main" val="11297269"/>
+      </p:ext>
+    </p:extLst>
+  </p:cSld>
+  <p:clrMapOvr>
+    <a:masterClrMapping/>
+  </p:clrMapOvr>
+</p:notes>
+</file>
+
+<file path=ppt/notesSlides/notesSlide8.xml><?xml version="1.0" encoding="utf-8"?>
+<p:notes xmlns:a="http://schemas.openxmlformats.org/drawingml/2006/main" xmlns:r="http://schemas.openxmlformats.org/officeDocument/2006/relationships" xmlns:p="http://schemas.openxmlformats.org/presentationml/2006/main">
+  <p:cSld>
+    <p:spTree>
+      <p:nvGrpSpPr>
+        <p:cNvPr id="1" name=""/>
+        <p:cNvGrpSpPr/>
+        <p:nvPr/>
+      </p:nvGrpSpPr>
+      <p:grpSpPr>
+        <a:xfrm>
+          <a:off x="0" y="0"/>
+          <a:ext cx="0" cy="0"/>
+          <a:chOff x="0" y="0"/>
+          <a:chExt cx="0" cy="0"/>
+        </a:xfrm>
+      </p:grpSpPr>
+      <p:sp>
+        <p:nvSpPr>
+          <p:cNvPr id="2" name="Slide Image Placeholder 1"/>
+          <p:cNvSpPr>
+            <a:spLocks noGrp="1" noRot="1" noChangeAspect="1"/>
+          </p:cNvSpPr>
+          <p:nvPr>
+            <p:ph type="sldImg"/>
+          </p:nvPr>
+        </p:nvSpPr>
+        <p:spPr/>
+      </p:sp>
+      <p:sp>
+        <p:nvSpPr>
+          <p:cNvPr id="3" name="Notes Placeholder 2"/>
+          <p:cNvSpPr>
+            <a:spLocks noGrp="1"/>
+          </p:cNvSpPr>
+          <p:nvPr>
+            <p:ph type="body" idx="1"/>
+          </p:nvPr>
+        </p:nvSpPr>
+        <p:spPr/>
+        <p:txBody>
+          <a:bodyPr/>
+          <a:lstStyle/>
+          <a:p>
+            <a:r>
+              <a:rPr lang="en-US" dirty="0" smtClean="0"/>
+              <a:t>SHOW THE APPLICATION!</a:t>
+            </a:r>
+          </a:p>
+          <a:p>
+            <a:r>
+              <a:rPr lang="en-US" dirty="0" smtClean="0"/>
+              <a:t>Make sure to call out that </a:t>
+            </a:r>
+            <a:r>
+              <a:rPr lang="en-US" dirty="0" err="1" smtClean="0"/>
+              <a:t>cukes</a:t>
+            </a:r>
+            <a:r>
+              <a:rPr lang="en-US" dirty="0" smtClean="0"/>
+              <a:t> should all be green after they make changes and that these things are already working.</a:t>
+            </a:r>
+          </a:p>
+          <a:p>
+            <a:r>
+              <a:rPr lang="en-US" dirty="0" smtClean="0"/>
+              <a:t>Call out that they should be able to build and run.</a:t>
+            </a:r>
+          </a:p>
+          <a:p>
+            <a:r>
+              <a:rPr lang="en-US" dirty="0" smtClean="0"/>
+              <a:t>Mention that there</a:t>
+            </a:r>
+            <a:r>
+              <a:rPr lang="en-US" baseline="0" dirty="0" smtClean="0"/>
+              <a:t> are unit tests in the project, but only the final solution has good coverage.</a:t>
+            </a:r>
+            <a:endParaRPr lang="en-US" dirty="0"/>
+          </a:p>
+        </p:txBody>
+      </p:sp>
+      <p:sp>
+        <p:nvSpPr>
+          <p:cNvPr id="4" name="Slide Number Placeholder 3"/>
+          <p:cNvSpPr>
+            <a:spLocks noGrp="1"/>
+          </p:cNvSpPr>
+          <p:nvPr>
+            <p:ph type="sldNum" sz="quarter" idx="10"/>
+          </p:nvPr>
+        </p:nvSpPr>
+        <p:spPr/>
+        <p:txBody>
+          <a:bodyPr/>
+          <a:lstStyle/>
+          <a:p>
+            <a:fld id="{5E646BB7-50E9-43CE-B8D8-A01580F287EB}" type="slidenum">
+              <a:rPr lang="en-US" smtClean="0"/>
+              <a:t>10</a:t>
+            </a:fld>
+            <a:endParaRPr lang="en-US"/>
+          </a:p>
+        </p:txBody>
+      </p:sp>
+    </p:spTree>
+    <p:extLst>
+      <p:ext uri="{BB962C8B-B14F-4D97-AF65-F5344CB8AC3E}">
+        <p14:creationId xmlns:p14="http://schemas.microsoft.com/office/powerpoint/2010/main" val="2420853714"/>
+      </p:ext>
+    </p:extLst>
+  </p:cSld>
+  <p:clrMapOvr>
+    <a:masterClrMapping/>
+  </p:clrMapOvr>
+</p:notes>
+</file>
+
+<file path=ppt/notesSlides/notesSlide9.xml><?xml version="1.0" encoding="utf-8"?>
+<p:notes xmlns:a="http://schemas.openxmlformats.org/drawingml/2006/main" xmlns:r="http://schemas.openxmlformats.org/officeDocument/2006/relationships" xmlns:p="http://schemas.openxmlformats.org/presentationml/2006/main">
+  <p:cSld>
+    <p:spTree>
+      <p:nvGrpSpPr>
+        <p:cNvPr id="1" name=""/>
+        <p:cNvGrpSpPr/>
+        <p:nvPr/>
+      </p:nvGrpSpPr>
+      <p:grpSpPr>
+        <a:xfrm>
+          <a:off x="0" y="0"/>
+          <a:ext cx="0" cy="0"/>
+          <a:chOff x="0" y="0"/>
+          <a:chExt cx="0" cy="0"/>
+        </a:xfrm>
+      </p:grpSpPr>
+      <p:sp>
+        <p:nvSpPr>
+          <p:cNvPr id="2" name="Slide Image Placeholder 1"/>
+          <p:cNvSpPr>
+            <a:spLocks noGrp="1" noRot="1" noChangeAspect="1"/>
+          </p:cNvSpPr>
+          <p:nvPr>
+            <p:ph type="sldImg"/>
+          </p:nvPr>
+        </p:nvSpPr>
+        <p:spPr/>
+      </p:sp>
+      <p:sp>
+        <p:nvSpPr>
+          <p:cNvPr id="3" name="Notes Placeholder 2"/>
+          <p:cNvSpPr>
+            <a:spLocks noGrp="1"/>
+          </p:cNvSpPr>
+          <p:nvPr>
+            <p:ph type="body" idx="1"/>
+          </p:nvPr>
+        </p:nvSpPr>
+        <p:spPr/>
+        <p:txBody>
+          <a:bodyPr/>
+          <a:lstStyle/>
+          <a:p>
+            <a:endParaRPr lang="en-US" dirty="0"/>
+          </a:p>
+        </p:txBody>
+      </p:sp>
+      <p:sp>
+        <p:nvSpPr>
+          <p:cNvPr id="4" name="Slide Number Placeholder 3"/>
+          <p:cNvSpPr>
+            <a:spLocks noGrp="1"/>
+          </p:cNvSpPr>
+          <p:nvPr>
+            <p:ph type="sldNum" sz="quarter" idx="10"/>
+          </p:nvPr>
+        </p:nvSpPr>
+        <p:spPr/>
+        <p:txBody>
+          <a:bodyPr/>
+          <a:lstStyle/>
+          <a:p>
+            <a:fld id="{5E646BB7-50E9-43CE-B8D8-A01580F287EB}" type="slidenum">
+              <a:rPr lang="en-US" smtClean="0"/>
+              <a:t>12</a:t>
+            </a:fld>
+            <a:endParaRPr lang="en-US"/>
+          </a:p>
+        </p:txBody>
+      </p:sp>
+    </p:spTree>
+    <p:extLst>
+      <p:ext uri="{BB962C8B-B14F-4D97-AF65-F5344CB8AC3E}">
+        <p14:creationId xmlns:p14="http://schemas.microsoft.com/office/powerpoint/2010/main" val="574377017"/>
       </p:ext>
     </p:extLst>
   </p:cSld>
@@ -5123,7 +5653,7 @@
     <p:bg>
       <p:bgPr>
         <a:blipFill dpi="0" rotWithShape="1">
-          <a:blip r:embed="rId2">
+          <a:blip r:embed="rId3">
             <a:lum/>
           </a:blip>
           <a:srcRect/>
@@ -5367,7 +5897,7 @@
           <p:nvPr/>
         </p:nvPicPr>
         <p:blipFill>
-          <a:blip r:embed="rId3">
+          <a:blip r:embed="rId4">
             <a:extLst>
               <a:ext uri="{28A0092B-C50C-407E-A947-70E740481C1C}">
                 <a14:useLocalDpi xmlns:a14="http://schemas.microsoft.com/office/drawing/2010/main" val="0"/>
@@ -5664,7 +6194,7 @@
     <p:bg>
       <p:bgPr>
         <a:blipFill dpi="0" rotWithShape="1">
-          <a:blip r:embed="rId2">
+          <a:blip r:embed="rId3">
             <a:lum/>
           </a:blip>
           <a:srcRect/>
@@ -5816,7 +6346,7 @@
           <p:nvPr/>
         </p:nvPicPr>
         <p:blipFill>
-          <a:blip r:embed="rId3" cstate="print">
+          <a:blip r:embed="rId4" cstate="print">
             <a:extLst>
               <a:ext uri="{28A0092B-C50C-407E-A947-70E740481C1C}">
                 <a14:useLocalDpi xmlns:a14="http://schemas.microsoft.com/office/drawing/2010/main" val="0"/>
@@ -5874,7 +6404,7 @@
     <p:bg>
       <p:bgPr>
         <a:blipFill dpi="0" rotWithShape="1">
-          <a:blip r:embed="rId2">
+          <a:blip r:embed="rId3">
             <a:lum/>
           </a:blip>
           <a:srcRect/>
@@ -5908,7 +6438,7 @@
           <p:nvPr/>
         </p:nvPicPr>
         <p:blipFill>
-          <a:blip r:embed="rId3">
+          <a:blip r:embed="rId4">
             <a:extLst>
               <a:ext uri="{28A0092B-C50C-407E-A947-70E740481C1C}">
                 <a14:useLocalDpi xmlns:a14="http://schemas.microsoft.com/office/drawing/2010/main" val="0"/>
@@ -6083,7 +6613,7 @@
     <p:bg>
       <p:bgPr>
         <a:blipFill dpi="0" rotWithShape="1">
-          <a:blip r:embed="rId2">
+          <a:blip r:embed="rId3">
             <a:lum/>
           </a:blip>
           <a:srcRect/>
@@ -6226,7 +6756,7 @@
           <p:nvPr/>
         </p:nvPicPr>
         <p:blipFill>
-          <a:blip r:embed="rId3">
+          <a:blip r:embed="rId4">
             <a:extLst>
               <a:ext uri="{28A0092B-C50C-407E-A947-70E740481C1C}">
                 <a14:useLocalDpi xmlns:a14="http://schemas.microsoft.com/office/drawing/2010/main" val="0"/>
@@ -6627,7 +7157,6 @@
               <a:rPr lang="fr-CA" sz="3600" dirty="0" smtClean="0"/>
               <a:t> report type?</a:t>
             </a:r>
-            <a:endParaRPr lang="fr-CA" sz="3600" dirty="0" smtClean="0"/>
           </a:p>
           <a:p>
             <a:pPr>
@@ -6699,7 +7228,6 @@
               <a:rPr lang="fr-CA" sz="3600" dirty="0" smtClean="0"/>
               <a:t>!</a:t>
             </a:r>
-            <a:endParaRPr lang="fr-CA" sz="3600" dirty="0" smtClean="0"/>
           </a:p>
         </p:txBody>
       </p:sp>
@@ -7910,7 +8438,7 @@
     <p:bg>
       <p:bgPr>
         <a:blipFill dpi="0" rotWithShape="1">
-          <a:blip r:embed="rId2">
+          <a:blip r:embed="rId3">
             <a:lum/>
           </a:blip>
           <a:srcRect/>
@@ -8084,7 +8612,7 @@
           <p:nvPr/>
         </p:nvPicPr>
         <p:blipFill>
-          <a:blip r:embed="rId3">
+          <a:blip r:embed="rId4">
             <a:extLst>
               <a:ext uri="{28A0092B-C50C-407E-A947-70E740481C1C}">
                 <a14:useLocalDpi xmlns:a14="http://schemas.microsoft.com/office/drawing/2010/main" val="0"/>
@@ -8147,7 +8675,7 @@
                             </p:stCondLst>
                             <p:childTnLst>
                               <p:par>
-                                <p:cTn id="5" presetID="31" presetClass="entr" presetSubtype="0" fill="hold" nodeType="clickEffect">
+                                <p:cTn id="5" presetID="1" presetClass="entr" presetSubtype="0" fill="hold" grpId="0" nodeType="clickEffect">
                                   <p:stCondLst>
                                     <p:cond delay="0"/>
                                   </p:stCondLst>
@@ -8155,6 +8683,202 @@
                                     <p:set>
                                       <p:cBhvr>
                                         <p:cTn id="6" dur="1" fill="hold">
+                                          <p:stCondLst>
+                                            <p:cond delay="0"/>
+                                          </p:stCondLst>
+                                        </p:cTn>
+                                        <p:tgtEl>
+                                          <p:spTgt spid="3">
+                                            <p:txEl>
+                                              <p:pRg st="0" end="0"/>
+                                            </p:txEl>
+                                          </p:spTgt>
+                                        </p:tgtEl>
+                                        <p:attrNameLst>
+                                          <p:attrName>style.visibility</p:attrName>
+                                        </p:attrNameLst>
+                                      </p:cBhvr>
+                                      <p:to>
+                                        <p:strVal val="visible"/>
+                                      </p:to>
+                                    </p:set>
+                                  </p:childTnLst>
+                                </p:cTn>
+                              </p:par>
+                            </p:childTnLst>
+                          </p:cTn>
+                        </p:par>
+                      </p:childTnLst>
+                    </p:cTn>
+                  </p:par>
+                  <p:par>
+                    <p:cTn id="7" fill="hold">
+                      <p:stCondLst>
+                        <p:cond delay="indefinite"/>
+                      </p:stCondLst>
+                      <p:childTnLst>
+                        <p:par>
+                          <p:cTn id="8" fill="hold">
+                            <p:stCondLst>
+                              <p:cond delay="0"/>
+                            </p:stCondLst>
+                            <p:childTnLst>
+                              <p:par>
+                                <p:cTn id="9" presetID="1" presetClass="entr" presetSubtype="0" fill="hold" grpId="0" nodeType="clickEffect">
+                                  <p:stCondLst>
+                                    <p:cond delay="0"/>
+                                  </p:stCondLst>
+                                  <p:childTnLst>
+                                    <p:set>
+                                      <p:cBhvr>
+                                        <p:cTn id="10" dur="1" fill="hold">
+                                          <p:stCondLst>
+                                            <p:cond delay="0"/>
+                                          </p:stCondLst>
+                                        </p:cTn>
+                                        <p:tgtEl>
+                                          <p:spTgt spid="3">
+                                            <p:txEl>
+                                              <p:pRg st="1" end="1"/>
+                                            </p:txEl>
+                                          </p:spTgt>
+                                        </p:tgtEl>
+                                        <p:attrNameLst>
+                                          <p:attrName>style.visibility</p:attrName>
+                                        </p:attrNameLst>
+                                      </p:cBhvr>
+                                      <p:to>
+                                        <p:strVal val="visible"/>
+                                      </p:to>
+                                    </p:set>
+                                  </p:childTnLst>
+                                </p:cTn>
+                              </p:par>
+                            </p:childTnLst>
+                          </p:cTn>
+                        </p:par>
+                      </p:childTnLst>
+                    </p:cTn>
+                  </p:par>
+                  <p:par>
+                    <p:cTn id="11" fill="hold">
+                      <p:stCondLst>
+                        <p:cond delay="indefinite"/>
+                      </p:stCondLst>
+                      <p:childTnLst>
+                        <p:par>
+                          <p:cTn id="12" fill="hold">
+                            <p:stCondLst>
+                              <p:cond delay="0"/>
+                            </p:stCondLst>
+                            <p:childTnLst>
+                              <p:par>
+                                <p:cTn id="13" presetID="1" presetClass="entr" presetSubtype="0" fill="hold" grpId="0" nodeType="clickEffect">
+                                  <p:stCondLst>
+                                    <p:cond delay="0"/>
+                                  </p:stCondLst>
+                                  <p:childTnLst>
+                                    <p:set>
+                                      <p:cBhvr>
+                                        <p:cTn id="14" dur="1" fill="hold">
+                                          <p:stCondLst>
+                                            <p:cond delay="0"/>
+                                          </p:stCondLst>
+                                        </p:cTn>
+                                        <p:tgtEl>
+                                          <p:spTgt spid="3">
+                                            <p:txEl>
+                                              <p:pRg st="2" end="2"/>
+                                            </p:txEl>
+                                          </p:spTgt>
+                                        </p:tgtEl>
+                                        <p:attrNameLst>
+                                          <p:attrName>style.visibility</p:attrName>
+                                        </p:attrNameLst>
+                                      </p:cBhvr>
+                                      <p:to>
+                                        <p:strVal val="visible"/>
+                                      </p:to>
+                                    </p:set>
+                                  </p:childTnLst>
+                                </p:cTn>
+                              </p:par>
+                            </p:childTnLst>
+                          </p:cTn>
+                        </p:par>
+                      </p:childTnLst>
+                    </p:cTn>
+                  </p:par>
+                  <p:par>
+                    <p:cTn id="15" fill="hold">
+                      <p:stCondLst>
+                        <p:cond delay="indefinite"/>
+                      </p:stCondLst>
+                      <p:childTnLst>
+                        <p:par>
+                          <p:cTn id="16" fill="hold">
+                            <p:stCondLst>
+                              <p:cond delay="0"/>
+                            </p:stCondLst>
+                            <p:childTnLst>
+                              <p:par>
+                                <p:cTn id="17" presetID="1" presetClass="entr" presetSubtype="0" fill="hold" grpId="0" nodeType="clickEffect">
+                                  <p:stCondLst>
+                                    <p:cond delay="0"/>
+                                  </p:stCondLst>
+                                  <p:childTnLst>
+                                    <p:set>
+                                      <p:cBhvr>
+                                        <p:cTn id="18" dur="1" fill="hold">
+                                          <p:stCondLst>
+                                            <p:cond delay="0"/>
+                                          </p:stCondLst>
+                                        </p:cTn>
+                                        <p:tgtEl>
+                                          <p:spTgt spid="3">
+                                            <p:txEl>
+                                              <p:pRg st="3" end="3"/>
+                                            </p:txEl>
+                                          </p:spTgt>
+                                        </p:tgtEl>
+                                        <p:attrNameLst>
+                                          <p:attrName>style.visibility</p:attrName>
+                                        </p:attrNameLst>
+                                      </p:cBhvr>
+                                      <p:to>
+                                        <p:strVal val="visible"/>
+                                      </p:to>
+                                    </p:set>
+                                  </p:childTnLst>
+                                </p:cTn>
+                              </p:par>
+                            </p:childTnLst>
+                          </p:cTn>
+                        </p:par>
+                      </p:childTnLst>
+                    </p:cTn>
+                  </p:par>
+                  <p:par>
+                    <p:cTn id="19" fill="hold">
+                      <p:stCondLst>
+                        <p:cond delay="indefinite"/>
+                      </p:stCondLst>
+                      <p:childTnLst>
+                        <p:par>
+                          <p:cTn id="20" fill="hold">
+                            <p:stCondLst>
+                              <p:cond delay="0"/>
+                            </p:stCondLst>
+                            <p:childTnLst>
+                              <p:par>
+                                <p:cTn id="21" presetID="31" presetClass="entr" presetSubtype="0" fill="hold" nodeType="clickEffect">
+                                  <p:stCondLst>
+                                    <p:cond delay="0"/>
+                                  </p:stCondLst>
+                                  <p:childTnLst>
+                                    <p:set>
+                                      <p:cBhvr>
+                                        <p:cTn id="22" dur="1" fill="hold">
                                           <p:stCondLst>
                                             <p:cond delay="0"/>
                                           </p:stCondLst>
@@ -8172,7 +8896,7 @@
                                     </p:set>
                                     <p:anim calcmode="lin" valueType="num">
                                       <p:cBhvr>
-                                        <p:cTn id="7" dur="1000" fill="hold"/>
+                                        <p:cTn id="23" dur="1000" fill="hold"/>
                                         <p:tgtEl>
                                           <p:spTgt spid="6"/>
                                         </p:tgtEl>
@@ -8195,7 +8919,7 @@
                                     </p:anim>
                                     <p:anim calcmode="lin" valueType="num">
                                       <p:cBhvr>
-                                        <p:cTn id="8" dur="1000" fill="hold"/>
+                                        <p:cTn id="24" dur="1000" fill="hold"/>
                                         <p:tgtEl>
                                           <p:spTgt spid="6"/>
                                         </p:tgtEl>
@@ -8218,7 +8942,7 @@
                                     </p:anim>
                                     <p:anim calcmode="lin" valueType="num">
                                       <p:cBhvr>
-                                        <p:cTn id="9" dur="1000" fill="hold"/>
+                                        <p:cTn id="25" dur="1000" fill="hold"/>
                                         <p:tgtEl>
                                           <p:spTgt spid="6"/>
                                         </p:tgtEl>
@@ -8241,7 +8965,7 @@
                                     </p:anim>
                                     <p:animEffect transition="in" filter="fade">
                                       <p:cBhvr>
-                                        <p:cTn id="10" dur="1000"/>
+                                        <p:cTn id="26" dur="1000"/>
                                         <p:tgtEl>
                                           <p:spTgt spid="6"/>
                                         </p:tgtEl>
@@ -8277,6 +9001,9 @@
         </p:cTn>
       </p:par>
     </p:tnLst>
+    <p:bldLst>
+      <p:bldP spid="3" grpId="0" uiExpand="1" build="p"/>
+    </p:bldLst>
   </p:timing>
 </p:sld>
 </file>

</xml_diff>